<commit_message>
Updated schematics and added sim data
</commit_message>
<xml_diff>
--- a/Schematics/CI_CM_VennDiag.pptx
+++ b/Schematics/CI_CM_VennDiag.pptx
@@ -243,7 +243,7 @@
           <a:p>
             <a:fld id="{1443360F-6A4A-114B-BF4E-EC83570D5527}" type="datetimeFigureOut">
               <a:rPr lang="en-US" smtClean="0"/>
-              <a:t>12/8/25</a:t>
+              <a:t>12/16/25</a:t>
             </a:fld>
             <a:endParaRPr lang="en-US"/>
           </a:p>
@@ -413,7 +413,7 @@
           <a:p>
             <a:fld id="{1443360F-6A4A-114B-BF4E-EC83570D5527}" type="datetimeFigureOut">
               <a:rPr lang="en-US" smtClean="0"/>
-              <a:t>12/8/25</a:t>
+              <a:t>12/16/25</a:t>
             </a:fld>
             <a:endParaRPr lang="en-US"/>
           </a:p>
@@ -593,7 +593,7 @@
           <a:p>
             <a:fld id="{1443360F-6A4A-114B-BF4E-EC83570D5527}" type="datetimeFigureOut">
               <a:rPr lang="en-US" smtClean="0"/>
-              <a:t>12/8/25</a:t>
+              <a:t>12/16/25</a:t>
             </a:fld>
             <a:endParaRPr lang="en-US"/>
           </a:p>
@@ -763,7 +763,7 @@
           <a:p>
             <a:fld id="{1443360F-6A4A-114B-BF4E-EC83570D5527}" type="datetimeFigureOut">
               <a:rPr lang="en-US" smtClean="0"/>
-              <a:t>12/8/25</a:t>
+              <a:t>12/16/25</a:t>
             </a:fld>
             <a:endParaRPr lang="en-US"/>
           </a:p>
@@ -1009,7 +1009,7 @@
           <a:p>
             <a:fld id="{1443360F-6A4A-114B-BF4E-EC83570D5527}" type="datetimeFigureOut">
               <a:rPr lang="en-US" smtClean="0"/>
-              <a:t>12/8/25</a:t>
+              <a:t>12/16/25</a:t>
             </a:fld>
             <a:endParaRPr lang="en-US"/>
           </a:p>
@@ -1241,7 +1241,7 @@
           <a:p>
             <a:fld id="{1443360F-6A4A-114B-BF4E-EC83570D5527}" type="datetimeFigureOut">
               <a:rPr lang="en-US" smtClean="0"/>
-              <a:t>12/8/25</a:t>
+              <a:t>12/16/25</a:t>
             </a:fld>
             <a:endParaRPr lang="en-US"/>
           </a:p>
@@ -1608,7 +1608,7 @@
           <a:p>
             <a:fld id="{1443360F-6A4A-114B-BF4E-EC83570D5527}" type="datetimeFigureOut">
               <a:rPr lang="en-US" smtClean="0"/>
-              <a:t>12/8/25</a:t>
+              <a:t>12/16/25</a:t>
             </a:fld>
             <a:endParaRPr lang="en-US"/>
           </a:p>
@@ -1726,7 +1726,7 @@
           <a:p>
             <a:fld id="{1443360F-6A4A-114B-BF4E-EC83570D5527}" type="datetimeFigureOut">
               <a:rPr lang="en-US" smtClean="0"/>
-              <a:t>12/8/25</a:t>
+              <a:t>12/16/25</a:t>
             </a:fld>
             <a:endParaRPr lang="en-US"/>
           </a:p>
@@ -1821,7 +1821,7 @@
           <a:p>
             <a:fld id="{1443360F-6A4A-114B-BF4E-EC83570D5527}" type="datetimeFigureOut">
               <a:rPr lang="en-US" smtClean="0"/>
-              <a:t>12/8/25</a:t>
+              <a:t>12/16/25</a:t>
             </a:fld>
             <a:endParaRPr lang="en-US"/>
           </a:p>
@@ -2098,7 +2098,7 @@
           <a:p>
             <a:fld id="{1443360F-6A4A-114B-BF4E-EC83570D5527}" type="datetimeFigureOut">
               <a:rPr lang="en-US" smtClean="0"/>
-              <a:t>12/8/25</a:t>
+              <a:t>12/16/25</a:t>
             </a:fld>
             <a:endParaRPr lang="en-US"/>
           </a:p>
@@ -2355,7 +2355,7 @@
           <a:p>
             <a:fld id="{1443360F-6A4A-114B-BF4E-EC83570D5527}" type="datetimeFigureOut">
               <a:rPr lang="en-US" smtClean="0"/>
-              <a:t>12/8/25</a:t>
+              <a:t>12/16/25</a:t>
             </a:fld>
             <a:endParaRPr lang="en-US"/>
           </a:p>
@@ -2568,7 +2568,7 @@
           <a:p>
             <a:fld id="{1443360F-6A4A-114B-BF4E-EC83570D5527}" type="datetimeFigureOut">
               <a:rPr lang="en-US" smtClean="0"/>
-              <a:t>12/8/25</a:t>
+              <a:t>12/16/25</a:t>
             </a:fld>
             <a:endParaRPr lang="en-US"/>
           </a:p>
@@ -3224,6 +3224,100 @@
           </a:p>
         </p:txBody>
       </p:sp>
+      <p:cxnSp>
+        <p:nvCxnSpPr>
+          <p:cNvPr id="15" name="Elbow Connector 14">
+            <a:extLst>
+              <a:ext uri="{FF2B5EF4-FFF2-40B4-BE49-F238E27FC236}">
+                <a16:creationId xmlns:a16="http://schemas.microsoft.com/office/drawing/2014/main" id="{3FFE81F4-8620-494B-91CD-D419DE806CA6}"/>
+              </a:ext>
+            </a:extLst>
+          </p:cNvPr>
+          <p:cNvCxnSpPr>
+            <a:cxnSpLocks/>
+          </p:cNvCxnSpPr>
+          <p:nvPr/>
+        </p:nvCxnSpPr>
+        <p:spPr>
+          <a:xfrm rot="10800000" flipV="1">
+            <a:off x="1701800" y="4521200"/>
+            <a:ext cx="2222500" cy="432602"/>
+          </a:xfrm>
+          <a:prstGeom prst="bentConnector3">
+            <a:avLst>
+              <a:gd name="adj1" fmla="val 100009"/>
+            </a:avLst>
+          </a:prstGeom>
+          <a:ln>
+            <a:solidFill>
+              <a:schemeClr val="tx1"/>
+            </a:solidFill>
+            <a:headEnd type="oval"/>
+            <a:tailEnd type="triangle"/>
+          </a:ln>
+        </p:spPr>
+        <p:style>
+          <a:lnRef idx="1">
+            <a:schemeClr val="accent1"/>
+          </a:lnRef>
+          <a:fillRef idx="0">
+            <a:schemeClr val="accent1"/>
+          </a:fillRef>
+          <a:effectRef idx="0">
+            <a:schemeClr val="accent1"/>
+          </a:effectRef>
+          <a:fontRef idx="minor">
+            <a:schemeClr val="tx1"/>
+          </a:fontRef>
+        </p:style>
+      </p:cxnSp>
+      <p:cxnSp>
+        <p:nvCxnSpPr>
+          <p:cNvPr id="20" name="Elbow Connector 19">
+            <a:extLst>
+              <a:ext uri="{FF2B5EF4-FFF2-40B4-BE49-F238E27FC236}">
+                <a16:creationId xmlns:a16="http://schemas.microsoft.com/office/drawing/2014/main" id="{315F72C3-C155-9B5E-03B2-17B3E99F6CF6}"/>
+              </a:ext>
+            </a:extLst>
+          </p:cNvPr>
+          <p:cNvCxnSpPr>
+            <a:cxnSpLocks/>
+          </p:cNvCxnSpPr>
+          <p:nvPr/>
+        </p:nvCxnSpPr>
+        <p:spPr>
+          <a:xfrm rot="5400000" flipH="1" flipV="1">
+            <a:off x="7822430" y="1649719"/>
+            <a:ext cx="1940155" cy="1247731"/>
+          </a:xfrm>
+          <a:prstGeom prst="bentConnector3">
+            <a:avLst>
+              <a:gd name="adj1" fmla="val -139"/>
+            </a:avLst>
+          </a:prstGeom>
+          <a:ln>
+            <a:solidFill>
+              <a:schemeClr val="tx1"/>
+            </a:solidFill>
+            <a:headEnd type="oval"/>
+            <a:tailEnd type="triangle"/>
+          </a:ln>
+        </p:spPr>
+        <p:style>
+          <a:lnRef idx="1">
+            <a:schemeClr val="accent1"/>
+          </a:lnRef>
+          <a:fillRef idx="0">
+            <a:schemeClr val="accent1"/>
+          </a:fillRef>
+          <a:effectRef idx="0">
+            <a:schemeClr val="accent1"/>
+          </a:effectRef>
+          <a:fontRef idx="minor">
+            <a:schemeClr val="tx1"/>
+          </a:fontRef>
+        </p:style>
+      </p:cxnSp>
     </p:spTree>
     <p:extLst>
       <p:ext uri="{BB962C8B-B14F-4D97-AF65-F5344CB8AC3E}">

</xml_diff>